<commit_message>
Just checking pptx conversion
</commit_message>
<xml_diff>
--- a/slides/1.Intro.pptx
+++ b/slides/1.Intro.pptx
@@ -307,7 +307,7 @@
           <a:p>
             <a:fld id="{241EB5C9-1307-BA42-ABA2-0BC069CD8E7F}" type="datetimeFigureOut">
               <a:rPr lang="en-US" smtClean="0"/>
-              <a:t>1/2/22</a:t>
+              <a:t>6/6/22</a:t>
             </a:fld>
             <a:endParaRPr lang="en-US"/>
           </a:p>
@@ -475,7 +475,7 @@
           <a:p>
             <a:fld id="{241EB5C9-1307-BA42-ABA2-0BC069CD8E7F}" type="datetimeFigureOut">
               <a:rPr lang="en-US" smtClean="0"/>
-              <a:t>1/2/22</a:t>
+              <a:t>6/6/22</a:t>
             </a:fld>
             <a:endParaRPr lang="en-US"/>
           </a:p>
@@ -653,7 +653,7 @@
           <a:p>
             <a:fld id="{241EB5C9-1307-BA42-ABA2-0BC069CD8E7F}" type="datetimeFigureOut">
               <a:rPr lang="en-US" smtClean="0"/>
-              <a:t>1/2/22</a:t>
+              <a:t>6/6/22</a:t>
             </a:fld>
             <a:endParaRPr lang="en-US"/>
           </a:p>
@@ -821,7 +821,7 @@
           <a:p>
             <a:fld id="{241EB5C9-1307-BA42-ABA2-0BC069CD8E7F}" type="datetimeFigureOut">
               <a:rPr lang="en-US" smtClean="0"/>
-              <a:t>1/2/22</a:t>
+              <a:t>6/6/22</a:t>
             </a:fld>
             <a:endParaRPr lang="en-US"/>
           </a:p>
@@ -1066,7 +1066,7 @@
           <a:p>
             <a:fld id="{241EB5C9-1307-BA42-ABA2-0BC069CD8E7F}" type="datetimeFigureOut">
               <a:rPr lang="en-US" smtClean="0"/>
-              <a:t>1/2/22</a:t>
+              <a:t>6/6/22</a:t>
             </a:fld>
             <a:endParaRPr lang="en-US"/>
           </a:p>
@@ -1351,7 +1351,7 @@
           <a:p>
             <a:fld id="{241EB5C9-1307-BA42-ABA2-0BC069CD8E7F}" type="datetimeFigureOut">
               <a:rPr lang="en-US" smtClean="0"/>
-              <a:t>1/2/22</a:t>
+              <a:t>6/6/22</a:t>
             </a:fld>
             <a:endParaRPr lang="en-US"/>
           </a:p>
@@ -1770,7 +1770,7 @@
           <a:p>
             <a:fld id="{241EB5C9-1307-BA42-ABA2-0BC069CD8E7F}" type="datetimeFigureOut">
               <a:rPr lang="en-US" smtClean="0"/>
-              <a:t>1/2/22</a:t>
+              <a:t>6/6/22</a:t>
             </a:fld>
             <a:endParaRPr lang="en-US"/>
           </a:p>
@@ -1887,7 +1887,7 @@
           <a:p>
             <a:fld id="{241EB5C9-1307-BA42-ABA2-0BC069CD8E7F}" type="datetimeFigureOut">
               <a:rPr lang="en-US" smtClean="0"/>
-              <a:t>1/2/22</a:t>
+              <a:t>6/6/22</a:t>
             </a:fld>
             <a:endParaRPr lang="en-US"/>
           </a:p>
@@ -1982,7 +1982,7 @@
           <a:p>
             <a:fld id="{241EB5C9-1307-BA42-ABA2-0BC069CD8E7F}" type="datetimeFigureOut">
               <a:rPr lang="en-US" smtClean="0"/>
-              <a:t>1/2/22</a:t>
+              <a:t>6/6/22</a:t>
             </a:fld>
             <a:endParaRPr lang="en-US"/>
           </a:p>
@@ -2257,7 +2257,7 @@
           <a:p>
             <a:fld id="{241EB5C9-1307-BA42-ABA2-0BC069CD8E7F}" type="datetimeFigureOut">
               <a:rPr lang="en-US" smtClean="0"/>
-              <a:t>1/2/22</a:t>
+              <a:t>6/6/22</a:t>
             </a:fld>
             <a:endParaRPr lang="en-US"/>
           </a:p>
@@ -2509,7 +2509,7 @@
           <a:p>
             <a:fld id="{241EB5C9-1307-BA42-ABA2-0BC069CD8E7F}" type="datetimeFigureOut">
               <a:rPr lang="en-US" smtClean="0"/>
-              <a:t>1/2/22</a:t>
+              <a:t>6/6/22</a:t>
             </a:fld>
             <a:endParaRPr lang="en-US"/>
           </a:p>
@@ -2720,7 +2720,7 @@
           <a:p>
             <a:fld id="{241EB5C9-1307-BA42-ABA2-0BC069CD8E7F}" type="datetimeFigureOut">
               <a:rPr lang="en-US" smtClean="0"/>
-              <a:t>1/2/22</a:t>
+              <a:t>6/6/22</a:t>
             </a:fld>
             <a:endParaRPr lang="en-US"/>
           </a:p>
@@ -3495,12 +3495,157 @@
                   </m:oMathPara>
                 </a14:m>
               </a:p>
+              <a:p>
+                <a:pPr lvl="0"/>
+                <a:r>
+                  <a:rPr/>
+                  <a:t>Eat eggs</a:t>
+                </a:r>
+              </a:p>
+              <a:p>
+                <a:pPr lvl="0"/>
+                <a:r>
+                  <a:rPr/>
+                  <a:t>Drink coffee</a:t>
+                </a:r>
+              </a:p>
             </p:txBody>
           </p:sp>
         </mc:Choice>
       </mc:AlternateContent>
     </p:spTree>
   </p:cSld>
+  <p:timing>
+    <p:tnLst>
+      <p:par>
+        <p:cTn id="1" dur="indefinite" restart="never" nodeType="tmRoot">
+          <p:childTnLst>
+            <p:seq concurrent="1" nextAc="seek">
+              <p:cTn id="2" dur="indefinite" nodeType="mainSeq">
+                <p:childTnLst>
+                  <p:par>
+                    <p:cTn id="3" fill="hold">
+                      <p:stCondLst>
+                        <p:cond delay="indefinite"/>
+                      </p:stCondLst>
+                      <p:childTnLst>
+                        <p:par>
+                          <p:cTn id="4" fill="hold">
+                            <p:stCondLst>
+                              <p:cond delay="0"/>
+                            </p:stCondLst>
+                            <p:childTnLst>
+                              <p:par>
+                                <p:cTn id="5" presetID="1" presetClass="entr" presetSubtype="0" fill="hold" grpId="0" nodeType="clickEffect">
+                                  <p:stCondLst>
+                                    <p:cond delay="0"/>
+                                  </p:stCondLst>
+                                  <p:childTnLst>
+                                    <p:set>
+                                      <p:cBhvr>
+                                        <p:cTn id="6" dur="1" fill="hold">
+                                          <p:stCondLst>
+                                            <p:cond delay="0"/>
+                                          </p:stCondLst>
+                                        </p:cTn>
+                                        <p:tgtEl>
+                                          <p:spTgt spid="3">
+                                            <p:txEl>
+                                              <p:pRg st="4" end="4"/>
+                                            </p:txEl>
+                                          </p:spTgt>
+                                        </p:tgtEl>
+                                        <p:attrNameLst>
+                                          <p:attrName>style.visibility</p:attrName>
+                                        </p:attrNameLst>
+                                      </p:cBhvr>
+                                      <p:to>
+                                        <p:strVal val="visible"/>
+                                      </p:to>
+                                    </p:set>
+                                  </p:childTnLst>
+                                </p:cTn>
+                              </p:par>
+                            </p:childTnLst>
+                          </p:cTn>
+                        </p:par>
+                      </p:childTnLst>
+                    </p:cTn>
+                  </p:par>
+                  <p:par>
+                    <p:cTn id="7" fill="hold">
+                      <p:stCondLst>
+                        <p:cond delay="indefinite"/>
+                      </p:stCondLst>
+                      <p:childTnLst>
+                        <p:par>
+                          <p:cTn id="8" fill="hold">
+                            <p:stCondLst>
+                              <p:cond delay="0"/>
+                            </p:stCondLst>
+                            <p:childTnLst>
+                              <p:par>
+                                <p:cTn id="9" presetID="1" presetClass="entr" presetSubtype="0" fill="hold" grpId="0" nodeType="clickEffect">
+                                  <p:stCondLst>
+                                    <p:cond delay="0"/>
+                                  </p:stCondLst>
+                                  <p:childTnLst>
+                                    <p:set>
+                                      <p:cBhvr>
+                                        <p:cTn id="10" dur="1" fill="hold">
+                                          <p:stCondLst>
+                                            <p:cond delay="0"/>
+                                          </p:stCondLst>
+                                        </p:cTn>
+                                        <p:tgtEl>
+                                          <p:spTgt spid="3">
+                                            <p:txEl>
+                                              <p:pRg st="5" end="5"/>
+                                            </p:txEl>
+                                          </p:spTgt>
+                                        </p:tgtEl>
+                                        <p:attrNameLst>
+                                          <p:attrName>style.visibility</p:attrName>
+                                        </p:attrNameLst>
+                                      </p:cBhvr>
+                                      <p:to>
+                                        <p:strVal val="visible"/>
+                                      </p:to>
+                                    </p:set>
+                                  </p:childTnLst>
+                                </p:cTn>
+                              </p:par>
+                            </p:childTnLst>
+                          </p:cTn>
+                        </p:par>
+                      </p:childTnLst>
+                    </p:cTn>
+                  </p:par>
+                </p:childTnLst>
+              </p:cTn>
+              <p:prevCondLst>
+                <p:cond evt="onPrev" delay="0">
+                  <p:tgtEl>
+                    <p:sldTgt/>
+                  </p:tgtEl>
+                </p:cond>
+              </p:prevCondLst>
+              <p:nextCondLst>
+                <p:cond evt="onNext" delay="0">
+                  <p:tgtEl>
+                    <p:sldTgt/>
+                  </p:tgtEl>
+                </p:cond>
+              </p:nextCondLst>
+            </p:seq>
+          </p:childTnLst>
+        </p:cTn>
+      </p:par>
+    </p:tnLst>
+    <p:bldLst>
+      <p:bldP spid="3" grpId="0" uiExpand="1" build="p"/>
+    </p:bldLst>
+  </p:timing>
 </p:sld>
 </file>
 
@@ -3565,16 +3710,6 @@
               <a:buNone/>
             </a:pPr>
             <a:r>
-              <a:rPr i="1">
-                <a:solidFill>
-                  <a:srgbClr val="BA2121"/>
-                </a:solidFill>
-                <a:latin typeface="Courier"/>
-              </a:rPr>
-              <a:t>###&lt;b&gt;</a:t>
-            </a:r>
-            <a:br/>
-            <a:r>
               <a:rPr>
                 <a:latin typeface="Courier"/>
               </a:rPr>
@@ -3623,7 +3758,7 @@
               <a:rPr>
                 <a:latin typeface="Courier"/>
               </a:rPr>
-              <a:t>,</a:t>
+              <a:t>, </a:t>
             </a:r>
             <a:r>
               <a:rPr>
@@ -3638,7 +3773,7 @@
               <a:rPr>
                 <a:latin typeface="Courier"/>
               </a:rPr>
-              <a:t>,</a:t>
+              <a:t>, </a:t>
             </a:r>
             <a:r>
               <a:rPr>
@@ -3654,16 +3789,6 @@
                 <a:latin typeface="Courier"/>
               </a:rPr>
               <a:t>)</a:t>
-            </a:r>
-            <a:br/>
-            <a:r>
-              <a:rPr i="1">
-                <a:solidFill>
-                  <a:srgbClr val="BA2121"/>
-                </a:solidFill>
-                <a:latin typeface="Courier"/>
-              </a:rPr>
-              <a:t>###&lt;b&gt;</a:t>
             </a:r>
             <a:br/>
             <a:br/>

</xml_diff>